<commit_message>
added the papers and files
</commit_message>
<xml_diff>
--- a/Paper_Presentation_pdf/presentation/ECE 590_Team 3_Presentation_final.pptx
+++ b/Paper_Presentation_pdf/presentation/ECE 590_Team 3_Presentation_final.pptx
@@ -9,8 +9,8 @@
   </p:notesMasterIdLst>
   <p:sldIdLst>
     <p:sldId id="256" r:id="rId2"/>
-    <p:sldId id="271" r:id="rId3"/>
-    <p:sldId id="272" r:id="rId4"/>
+    <p:sldId id="272" r:id="rId3"/>
+    <p:sldId id="271" r:id="rId4"/>
     <p:sldId id="257" r:id="rId5"/>
     <p:sldId id="261" r:id="rId6"/>
     <p:sldId id="262" r:id="rId7"/>
@@ -213,7 +213,7 @@
           <a:p>
             <a:fld id="{9AD25FD3-BFCF-CF4A-9B89-46B09B356939}" type="datetimeFigureOut">
               <a:rPr lang="en-US" smtClean="0"/>
-              <a:t>4/9/15</a:t>
+              <a:t>4/10/15</a:t>
             </a:fld>
             <a:endParaRPr lang="en-US"/>
           </a:p>
@@ -602,7 +602,7 @@
           <a:p>
             <a:fld id="{FBE422AC-62A6-4154-A016-C5BB8341F6F1}" type="slidenum">
               <a:rPr lang="zh-CN" altLang="en-US" smtClean="0"/>
-              <a:t>2</a:t>
+              <a:t>3</a:t>
             </a:fld>
             <a:endParaRPr lang="zh-CN" altLang="en-US"/>
           </a:p>
@@ -886,7 +886,7 @@
           <a:p>
             <a:fld id="{70FAA508-F0CD-46EA-95FB-26B559A0B5D9}" type="datetimeFigureOut">
               <a:rPr lang="en-US" smtClean="0"/>
-              <a:t>4/9/15</a:t>
+              <a:t>4/10/15</a:t>
             </a:fld>
             <a:endParaRPr lang="en-US"/>
           </a:p>
@@ -1056,7 +1056,7 @@
           <a:p>
             <a:fld id="{70FAA508-F0CD-46EA-95FB-26B559A0B5D9}" type="datetimeFigureOut">
               <a:rPr lang="en-US" smtClean="0"/>
-              <a:t>4/9/15</a:t>
+              <a:t>4/10/15</a:t>
             </a:fld>
             <a:endParaRPr lang="en-US"/>
           </a:p>
@@ -1236,7 +1236,7 @@
           <a:p>
             <a:fld id="{70FAA508-F0CD-46EA-95FB-26B559A0B5D9}" type="datetimeFigureOut">
               <a:rPr lang="en-US" smtClean="0"/>
-              <a:t>4/9/15</a:t>
+              <a:t>4/10/15</a:t>
             </a:fld>
             <a:endParaRPr lang="en-US"/>
           </a:p>
@@ -1406,7 +1406,7 @@
           <a:p>
             <a:fld id="{70FAA508-F0CD-46EA-95FB-26B559A0B5D9}" type="datetimeFigureOut">
               <a:rPr lang="en-US" smtClean="0"/>
-              <a:t>4/9/15</a:t>
+              <a:t>4/10/15</a:t>
             </a:fld>
             <a:endParaRPr lang="en-US"/>
           </a:p>
@@ -1652,7 +1652,7 @@
           <a:p>
             <a:fld id="{70FAA508-F0CD-46EA-95FB-26B559A0B5D9}" type="datetimeFigureOut">
               <a:rPr lang="en-US" smtClean="0"/>
-              <a:t>4/9/15</a:t>
+              <a:t>4/10/15</a:t>
             </a:fld>
             <a:endParaRPr lang="en-US"/>
           </a:p>
@@ -1940,7 +1940,7 @@
           <a:p>
             <a:fld id="{70FAA508-F0CD-46EA-95FB-26B559A0B5D9}" type="datetimeFigureOut">
               <a:rPr lang="en-US" smtClean="0"/>
-              <a:t>4/9/15</a:t>
+              <a:t>4/10/15</a:t>
             </a:fld>
             <a:endParaRPr lang="en-US"/>
           </a:p>
@@ -2362,7 +2362,7 @@
           <a:p>
             <a:fld id="{70FAA508-F0CD-46EA-95FB-26B559A0B5D9}" type="datetimeFigureOut">
               <a:rPr lang="en-US" smtClean="0"/>
-              <a:t>4/9/15</a:t>
+              <a:t>4/10/15</a:t>
             </a:fld>
             <a:endParaRPr lang="en-US"/>
           </a:p>
@@ -2480,7 +2480,7 @@
           <a:p>
             <a:fld id="{70FAA508-F0CD-46EA-95FB-26B559A0B5D9}" type="datetimeFigureOut">
               <a:rPr lang="en-US" smtClean="0"/>
-              <a:t>4/9/15</a:t>
+              <a:t>4/10/15</a:t>
             </a:fld>
             <a:endParaRPr lang="en-US"/>
           </a:p>
@@ -2575,7 +2575,7 @@
           <a:p>
             <a:fld id="{70FAA508-F0CD-46EA-95FB-26B559A0B5D9}" type="datetimeFigureOut">
               <a:rPr lang="en-US" smtClean="0"/>
-              <a:t>4/9/15</a:t>
+              <a:t>4/10/15</a:t>
             </a:fld>
             <a:endParaRPr lang="en-US"/>
           </a:p>
@@ -2852,7 +2852,7 @@
           <a:p>
             <a:fld id="{70FAA508-F0CD-46EA-95FB-26B559A0B5D9}" type="datetimeFigureOut">
               <a:rPr lang="en-US" smtClean="0"/>
-              <a:t>4/9/15</a:t>
+              <a:t>4/10/15</a:t>
             </a:fld>
             <a:endParaRPr lang="en-US"/>
           </a:p>
@@ -3105,7 +3105,7 @@
           <a:p>
             <a:fld id="{70FAA508-F0CD-46EA-95FB-26B559A0B5D9}" type="datetimeFigureOut">
               <a:rPr lang="en-US" smtClean="0"/>
-              <a:t>4/9/15</a:t>
+              <a:t>4/10/15</a:t>
             </a:fld>
             <a:endParaRPr lang="en-US"/>
           </a:p>
@@ -3318,7 +3318,7 @@
           <a:p>
             <a:fld id="{70FAA508-F0CD-46EA-95FB-26B559A0B5D9}" type="datetimeFigureOut">
               <a:rPr lang="en-US" smtClean="0"/>
-              <a:t>4/9/15</a:t>
+              <a:t>4/10/15</a:t>
             </a:fld>
             <a:endParaRPr lang="en-US"/>
           </a:p>
@@ -3797,6 +3797,13 @@
   <p:clrMapOvr>
     <a:masterClrMapping/>
   </p:clrMapOvr>
+  <p:timing>
+    <p:tnLst>
+      <p:par>
+        <p:cTn xmlns:p14="http://schemas.microsoft.com/office/powerpoint/2010/main" id="1" dur="indefinite" restart="never" nodeType="tmRoot"/>
+      </p:par>
+    </p:tnLst>
+  </p:timing>
 </p:sld>
 </file>
 
@@ -4153,6 +4160,13 @@
   <p:clrMapOvr>
     <a:masterClrMapping/>
   </p:clrMapOvr>
+  <p:timing>
+    <p:tnLst>
+      <p:par>
+        <p:cTn xmlns:p14="http://schemas.microsoft.com/office/powerpoint/2010/main" id="1" dur="indefinite" restart="never" nodeType="tmRoot"/>
+      </p:par>
+    </p:tnLst>
+  </p:timing>
 </p:sld>
 </file>
 
@@ -4436,6 +4450,13 @@
   <p:clrMapOvr>
     <a:masterClrMapping/>
   </p:clrMapOvr>
+  <p:timing>
+    <p:tnLst>
+      <p:par>
+        <p:cTn xmlns:p14="http://schemas.microsoft.com/office/powerpoint/2010/main" id="1" dur="indefinite" restart="never" nodeType="tmRoot"/>
+      </p:par>
+    </p:tnLst>
+  </p:timing>
 </p:sld>
 </file>
 
@@ -4837,6 +4858,13 @@
   <p:clrMapOvr>
     <a:masterClrMapping/>
   </p:clrMapOvr>
+  <p:timing>
+    <p:tnLst>
+      <p:par>
+        <p:cTn xmlns:p14="http://schemas.microsoft.com/office/powerpoint/2010/main" id="1" dur="indefinite" restart="never" nodeType="tmRoot"/>
+      </p:par>
+    </p:tnLst>
+  </p:timing>
 </p:sld>
 </file>
 
@@ -5138,6 +5166,13 @@
   <p:clrMapOvr>
     <a:masterClrMapping/>
   </p:clrMapOvr>
+  <p:timing>
+    <p:tnLst>
+      <p:par>
+        <p:cTn xmlns:p14="http://schemas.microsoft.com/office/powerpoint/2010/main" id="1" dur="indefinite" restart="never" nodeType="tmRoot"/>
+      </p:par>
+    </p:tnLst>
+  </p:timing>
 </p:sld>
 </file>
 
@@ -5311,6 +5346,13 @@
   <p:clrMapOvr>
     <a:masterClrMapping/>
   </p:clrMapOvr>
+  <p:timing>
+    <p:tnLst>
+      <p:par>
+        <p:cTn xmlns:p14="http://schemas.microsoft.com/office/powerpoint/2010/main" id="1" dur="indefinite" restart="never" nodeType="tmRoot"/>
+      </p:par>
+    </p:tnLst>
+  </p:timing>
 </p:sld>
 </file>
 
@@ -5492,6 +5534,13 @@
   <p:clrMapOvr>
     <a:masterClrMapping/>
   </p:clrMapOvr>
+  <p:timing>
+    <p:tnLst>
+      <p:par>
+        <p:cTn xmlns:p14="http://schemas.microsoft.com/office/powerpoint/2010/main" id="1" dur="indefinite" restart="never" nodeType="tmRoot"/>
+      </p:par>
+    </p:tnLst>
+  </p:timing>
 </p:sld>
 </file>
 
@@ -5644,10 +5693,251 @@
   <p:clrMapOvr>
     <a:masterClrMapping/>
   </p:clrMapOvr>
+  <p:timing>
+    <p:tnLst>
+      <p:par>
+        <p:cTn xmlns:p14="http://schemas.microsoft.com/office/powerpoint/2010/main" id="1" dur="indefinite" restart="never" nodeType="tmRoot"/>
+      </p:par>
+    </p:tnLst>
+  </p:timing>
 </p:sld>
 </file>
 
 <file path=ppt/slides/slide2.xml><?xml version="1.0" encoding="utf-8"?>
+<p:sld xmlns:a="http://schemas.openxmlformats.org/drawingml/2006/main" xmlns:r="http://schemas.openxmlformats.org/officeDocument/2006/relationships" xmlns:p="http://schemas.openxmlformats.org/presentationml/2006/main">
+  <p:cSld>
+    <p:spTree>
+      <p:nvGrpSpPr>
+        <p:cNvPr id="1" name=""/>
+        <p:cNvGrpSpPr/>
+        <p:nvPr/>
+      </p:nvGrpSpPr>
+      <p:grpSpPr>
+        <a:xfrm>
+          <a:off x="0" y="0"/>
+          <a:ext cx="0" cy="0"/>
+          <a:chOff x="0" y="0"/>
+          <a:chExt cx="0" cy="0"/>
+        </a:xfrm>
+      </p:grpSpPr>
+      <p:sp>
+        <p:nvSpPr>
+          <p:cNvPr id="2" name="Title 1"/>
+          <p:cNvSpPr>
+            <a:spLocks noGrp="1"/>
+          </p:cNvSpPr>
+          <p:nvPr>
+            <p:ph type="title"/>
+          </p:nvPr>
+        </p:nvSpPr>
+        <p:spPr/>
+        <p:txBody>
+          <a:bodyPr/>
+          <a:lstStyle/>
+          <a:p>
+            <a:r>
+              <a:rPr lang="en-US" dirty="0" smtClean="0"/>
+              <a:t>Presumption of the </a:t>
+            </a:r>
+            <a:r>
+              <a:rPr lang="en-US" dirty="0" err="1" smtClean="0"/>
+              <a:t>Deblurring</a:t>
+            </a:r>
+            <a:r>
+              <a:rPr lang="en-US" dirty="0" smtClean="0"/>
+              <a:t> </a:t>
+            </a:r>
+            <a:endParaRPr lang="en-US" dirty="0"/>
+          </a:p>
+        </p:txBody>
+      </p:sp>
+      <p:pic>
+        <p:nvPicPr>
+          <p:cNvPr id="4" name="Picture 3" descr="Screen Shot 2015-04-09 at 7.13.44 PM.png"/>
+          <p:cNvPicPr>
+            <a:picLocks noChangeAspect="1"/>
+          </p:cNvPicPr>
+          <p:nvPr/>
+        </p:nvPicPr>
+        <p:blipFill>
+          <a:blip r:embed="rId2" cstate="email">
+            <a:extLst>
+              <a:ext uri="{28A0092B-C50C-407E-A947-70E740481C1C}">
+                <a14:useLocalDpi xmlns:a14="http://schemas.microsoft.com/office/drawing/2010/main" val="0"/>
+              </a:ext>
+            </a:extLst>
+          </a:blip>
+          <a:stretch>
+            <a:fillRect/>
+          </a:stretch>
+        </p:blipFill>
+        <p:spPr>
+          <a:xfrm>
+            <a:off x="1481340" y="2277248"/>
+            <a:ext cx="5570281" cy="3820056"/>
+          </a:xfrm>
+          <a:prstGeom prst="rect">
+            <a:avLst/>
+          </a:prstGeom>
+        </p:spPr>
+      </p:pic>
+      <p:sp>
+        <p:nvSpPr>
+          <p:cNvPr id="5" name="TextBox 4"/>
+          <p:cNvSpPr txBox="1"/>
+          <p:nvPr/>
+        </p:nvSpPr>
+        <p:spPr>
+          <a:xfrm>
+            <a:off x="1481340" y="1353918"/>
+            <a:ext cx="4625433" cy="923330"/>
+          </a:xfrm>
+          <a:prstGeom prst="rect">
+            <a:avLst/>
+          </a:prstGeom>
+          <a:noFill/>
+        </p:spPr>
+        <p:txBody>
+          <a:bodyPr wrap="none" rtlCol="0">
+            <a:spAutoFit/>
+          </a:bodyPr>
+          <a:lstStyle/>
+          <a:p>
+            <a:pPr marL="285750" indent="-285750">
+              <a:buFont typeface="Arial" pitchFamily="34" charset="0"/>
+              <a:buChar char="•"/>
+            </a:pPr>
+            <a:r>
+              <a:rPr lang="en-US" dirty="0" smtClean="0"/>
+              <a:t>Hand</a:t>
+            </a:r>
+            <a:r>
+              <a:rPr lang="zh-CN" altLang="en-US" dirty="0" smtClean="0"/>
+              <a:t> </a:t>
+            </a:r>
+            <a:r>
+              <a:rPr lang="en-US" altLang="zh-CN" dirty="0" smtClean="0"/>
+              <a:t>shake</a:t>
+            </a:r>
+            <a:r>
+              <a:rPr lang="zh-CN" altLang="en-US" dirty="0" smtClean="0"/>
+              <a:t> </a:t>
+            </a:r>
+            <a:r>
+              <a:rPr lang="en-US" altLang="zh-CN" dirty="0" smtClean="0"/>
+              <a:t>blur</a:t>
+            </a:r>
+            <a:endParaRPr lang="en-US" altLang="zh-CN" dirty="0"/>
+          </a:p>
+          <a:p>
+            <a:pPr marL="285750" indent="-285750">
+              <a:buFont typeface="Arial" pitchFamily="34" charset="0"/>
+              <a:buChar char="•"/>
+            </a:pPr>
+            <a:r>
+              <a:rPr lang="en-US" altLang="zh-CN" dirty="0" smtClean="0"/>
+              <a:t>Out</a:t>
+            </a:r>
+            <a:r>
+              <a:rPr lang="zh-CN" altLang="en-US" dirty="0" smtClean="0"/>
+              <a:t> </a:t>
+            </a:r>
+            <a:r>
+              <a:rPr lang="en-US" altLang="zh-CN" dirty="0" smtClean="0"/>
+              <a:t>of</a:t>
+            </a:r>
+            <a:r>
+              <a:rPr lang="zh-CN" altLang="en-US" dirty="0" smtClean="0"/>
+              <a:t> </a:t>
+            </a:r>
+            <a:r>
+              <a:rPr lang="en-US" altLang="zh-CN" dirty="0" smtClean="0"/>
+              <a:t>focus</a:t>
+            </a:r>
+            <a:r>
+              <a:rPr lang="zh-CN" altLang="en-US" dirty="0" smtClean="0"/>
+              <a:t> </a:t>
+            </a:r>
+            <a:r>
+              <a:rPr lang="en-US" altLang="zh-CN" dirty="0" smtClean="0"/>
+              <a:t>blur</a:t>
+            </a:r>
+            <a:r>
+              <a:rPr lang="zh-CN" altLang="en-US" dirty="0" smtClean="0"/>
+              <a:t> </a:t>
+            </a:r>
+            <a:r>
+              <a:rPr lang="en-US" altLang="zh-CN" dirty="0" smtClean="0"/>
+              <a:t>with</a:t>
+            </a:r>
+            <a:r>
+              <a:rPr lang="zh-CN" altLang="en-US" dirty="0" smtClean="0"/>
+              <a:t> </a:t>
+            </a:r>
+            <a:r>
+              <a:rPr lang="en-US" altLang="zh-CN" dirty="0" smtClean="0"/>
+              <a:t>little</a:t>
+            </a:r>
+            <a:r>
+              <a:rPr lang="zh-CN" altLang="en-US" dirty="0" smtClean="0"/>
+              <a:t> </a:t>
+            </a:r>
+            <a:r>
+              <a:rPr lang="en-US" altLang="zh-CN" dirty="0" smtClean="0"/>
+              <a:t>depths</a:t>
+            </a:r>
+            <a:r>
+              <a:rPr lang="zh-CN" altLang="en-US" dirty="0" smtClean="0"/>
+              <a:t> </a:t>
+            </a:r>
+            <a:r>
+              <a:rPr lang="en-US" altLang="zh-CN" dirty="0" smtClean="0"/>
+              <a:t>of</a:t>
+            </a:r>
+            <a:r>
+              <a:rPr lang="zh-CN" altLang="en-US" dirty="0" smtClean="0"/>
+              <a:t> </a:t>
+            </a:r>
+            <a:r>
+              <a:rPr lang="en-US" altLang="zh-CN" dirty="0" smtClean="0"/>
+              <a:t>fields</a:t>
+            </a:r>
+            <a:r>
+              <a:rPr lang="zh-CN" altLang="en-US" dirty="0" smtClean="0"/>
+              <a:t>   </a:t>
+            </a:r>
+            <a:endParaRPr lang="en-US" altLang="zh-CN" dirty="0" smtClean="0"/>
+          </a:p>
+          <a:p>
+            <a:r>
+              <a:rPr lang="zh-CN" altLang="en-US" dirty="0" smtClean="0"/>
+              <a:t> </a:t>
+            </a:r>
+            <a:endParaRPr lang="en-US" dirty="0"/>
+          </a:p>
+        </p:txBody>
+      </p:sp>
+    </p:spTree>
+    <p:extLst>
+      <p:ext uri="{BB962C8B-B14F-4D97-AF65-F5344CB8AC3E}">
+        <p14:creationId xmlns:p14="http://schemas.microsoft.com/office/powerpoint/2010/main" val="353346647"/>
+      </p:ext>
+    </p:extLst>
+  </p:cSld>
+  <p:clrMapOvr>
+    <a:masterClrMapping/>
+  </p:clrMapOvr>
+  <p:timing>
+    <p:tnLst>
+      <p:par>
+        <p:cTn xmlns:p14="http://schemas.microsoft.com/office/powerpoint/2010/main" id="1" dur="indefinite" restart="never" nodeType="tmRoot"/>
+      </p:par>
+    </p:tnLst>
+  </p:timing>
+</p:sld>
+</file>
+
+<file path=ppt/slides/slide3.xml><?xml version="1.0" encoding="utf-8"?>
 <p:sld xmlns:a="http://schemas.openxmlformats.org/drawingml/2006/main" xmlns:r="http://schemas.openxmlformats.org/officeDocument/2006/relationships" xmlns:p="http://schemas.openxmlformats.org/presentationml/2006/main">
   <p:cSld>
     <p:spTree>
@@ -6016,233 +6306,13 @@
   <p:clrMapOvr>
     <a:masterClrMapping/>
   </p:clrMapOvr>
-</p:sld>
-</file>
-
-<file path=ppt/slides/slide3.xml><?xml version="1.0" encoding="utf-8"?>
-<p:sld xmlns:a="http://schemas.openxmlformats.org/drawingml/2006/main" xmlns:r="http://schemas.openxmlformats.org/officeDocument/2006/relationships" xmlns:p="http://schemas.openxmlformats.org/presentationml/2006/main">
-  <p:cSld>
-    <p:spTree>
-      <p:nvGrpSpPr>
-        <p:cNvPr id="1" name=""/>
-        <p:cNvGrpSpPr/>
-        <p:nvPr/>
-      </p:nvGrpSpPr>
-      <p:grpSpPr>
-        <a:xfrm>
-          <a:off x="0" y="0"/>
-          <a:ext cx="0" cy="0"/>
-          <a:chOff x="0" y="0"/>
-          <a:chExt cx="0" cy="0"/>
-        </a:xfrm>
-      </p:grpSpPr>
-      <p:sp>
-        <p:nvSpPr>
-          <p:cNvPr id="2" name="Title 1"/>
-          <p:cNvSpPr>
-            <a:spLocks noGrp="1"/>
-          </p:cNvSpPr>
-          <p:nvPr>
-            <p:ph type="title"/>
-          </p:nvPr>
-        </p:nvSpPr>
-        <p:spPr/>
-        <p:txBody>
-          <a:bodyPr/>
-          <a:lstStyle/>
-          <a:p>
-            <a:r>
-              <a:rPr lang="en-US" dirty="0" smtClean="0"/>
-              <a:t>Presumption of the </a:t>
-            </a:r>
-            <a:r>
-              <a:rPr lang="en-US" dirty="0" err="1" smtClean="0"/>
-              <a:t>Deblurring</a:t>
-            </a:r>
-            <a:r>
-              <a:rPr lang="en-US" dirty="0" smtClean="0"/>
-              <a:t> </a:t>
-            </a:r>
-            <a:endParaRPr lang="en-US" dirty="0"/>
-          </a:p>
-        </p:txBody>
-      </p:sp>
-      <p:pic>
-        <p:nvPicPr>
-          <p:cNvPr id="4" name="Picture 3" descr="Screen Shot 2015-04-09 at 7.13.44 PM.png"/>
-          <p:cNvPicPr>
-            <a:picLocks noChangeAspect="1"/>
-          </p:cNvPicPr>
-          <p:nvPr/>
-        </p:nvPicPr>
-        <p:blipFill>
-          <a:blip r:embed="rId2" cstate="email">
-            <a:extLst>
-              <a:ext uri="{28A0092B-C50C-407E-A947-70E740481C1C}">
-                <a14:useLocalDpi xmlns:a14="http://schemas.microsoft.com/office/drawing/2010/main" val="0"/>
-              </a:ext>
-            </a:extLst>
-          </a:blip>
-          <a:stretch>
-            <a:fillRect/>
-          </a:stretch>
-        </p:blipFill>
-        <p:spPr>
-          <a:xfrm>
-            <a:off x="1481340" y="2277248"/>
-            <a:ext cx="5570281" cy="3820056"/>
-          </a:xfrm>
-          <a:prstGeom prst="rect">
-            <a:avLst/>
-          </a:prstGeom>
-        </p:spPr>
-      </p:pic>
-      <p:sp>
-        <p:nvSpPr>
-          <p:cNvPr id="5" name="TextBox 4"/>
-          <p:cNvSpPr txBox="1"/>
-          <p:nvPr/>
-        </p:nvSpPr>
-        <p:spPr>
-          <a:xfrm>
-            <a:off x="1481340" y="1353918"/>
-            <a:ext cx="4625433" cy="923330"/>
-          </a:xfrm>
-          <a:prstGeom prst="rect">
-            <a:avLst/>
-          </a:prstGeom>
-          <a:noFill/>
-        </p:spPr>
-        <p:txBody>
-          <a:bodyPr wrap="none" rtlCol="0">
-            <a:spAutoFit/>
-          </a:bodyPr>
-          <a:lstStyle/>
-          <a:p>
-            <a:pPr marL="285750" indent="-285750">
-              <a:buFont typeface="Arial" pitchFamily="34" charset="0"/>
-              <a:buChar char="•"/>
-            </a:pPr>
-            <a:r>
-              <a:rPr lang="en-US" dirty="0" smtClean="0"/>
-              <a:t>Hand</a:t>
-            </a:r>
-            <a:r>
-              <a:rPr lang="zh-CN" altLang="en-US" dirty="0" smtClean="0"/>
-              <a:t> </a:t>
-            </a:r>
-            <a:r>
-              <a:rPr lang="en-US" altLang="zh-CN" dirty="0" smtClean="0"/>
-              <a:t>shake</a:t>
-            </a:r>
-            <a:r>
-              <a:rPr lang="zh-CN" altLang="en-US" dirty="0" smtClean="0"/>
-              <a:t> </a:t>
-            </a:r>
-            <a:r>
-              <a:rPr lang="en-US" altLang="zh-CN" dirty="0" smtClean="0"/>
-              <a:t>blur</a:t>
-            </a:r>
-            <a:endParaRPr lang="en-US" altLang="zh-CN" dirty="0"/>
-          </a:p>
-          <a:p>
-            <a:pPr marL="285750" indent="-285750">
-              <a:buFont typeface="Arial" pitchFamily="34" charset="0"/>
-              <a:buChar char="•"/>
-            </a:pPr>
-            <a:r>
-              <a:rPr lang="en-US" altLang="zh-CN" dirty="0" smtClean="0"/>
-              <a:t>Out</a:t>
-            </a:r>
-            <a:r>
-              <a:rPr lang="zh-CN" altLang="en-US" dirty="0" smtClean="0"/>
-              <a:t> </a:t>
-            </a:r>
-            <a:r>
-              <a:rPr lang="en-US" altLang="zh-CN" dirty="0" smtClean="0"/>
-              <a:t>of</a:t>
-            </a:r>
-            <a:r>
-              <a:rPr lang="zh-CN" altLang="en-US" dirty="0" smtClean="0"/>
-              <a:t> </a:t>
-            </a:r>
-            <a:r>
-              <a:rPr lang="en-US" altLang="zh-CN" dirty="0" smtClean="0"/>
-              <a:t>focus</a:t>
-            </a:r>
-            <a:r>
-              <a:rPr lang="zh-CN" altLang="en-US" dirty="0" smtClean="0"/>
-              <a:t> </a:t>
-            </a:r>
-            <a:r>
-              <a:rPr lang="en-US" altLang="zh-CN" dirty="0" smtClean="0"/>
-              <a:t>blur</a:t>
-            </a:r>
-            <a:r>
-              <a:rPr lang="zh-CN" altLang="en-US" dirty="0" smtClean="0"/>
-              <a:t> </a:t>
-            </a:r>
-            <a:r>
-              <a:rPr lang="en-US" altLang="zh-CN" dirty="0" smtClean="0"/>
-              <a:t>with</a:t>
-            </a:r>
-            <a:r>
-              <a:rPr lang="zh-CN" altLang="en-US" dirty="0" smtClean="0"/>
-              <a:t> </a:t>
-            </a:r>
-            <a:r>
-              <a:rPr lang="en-US" altLang="zh-CN" dirty="0" smtClean="0"/>
-              <a:t>little</a:t>
-            </a:r>
-            <a:r>
-              <a:rPr lang="zh-CN" altLang="en-US" dirty="0" smtClean="0"/>
-              <a:t> </a:t>
-            </a:r>
-            <a:r>
-              <a:rPr lang="en-US" altLang="zh-CN" dirty="0" smtClean="0"/>
-              <a:t>depths</a:t>
-            </a:r>
-            <a:r>
-              <a:rPr lang="zh-CN" altLang="en-US" dirty="0" smtClean="0"/>
-              <a:t> </a:t>
-            </a:r>
-            <a:r>
-              <a:rPr lang="en-US" altLang="zh-CN" dirty="0" smtClean="0"/>
-              <a:t>of</a:t>
-            </a:r>
-            <a:r>
-              <a:rPr lang="zh-CN" altLang="en-US" dirty="0" smtClean="0"/>
-              <a:t> </a:t>
-            </a:r>
-            <a:r>
-              <a:rPr lang="en-US" altLang="zh-CN" dirty="0" smtClean="0"/>
-              <a:t>fields</a:t>
-            </a:r>
-            <a:r>
-              <a:rPr lang="zh-CN" altLang="en-US" dirty="0" smtClean="0"/>
-              <a:t>   </a:t>
-            </a:r>
-            <a:endParaRPr lang="en-US" altLang="zh-CN" dirty="0" smtClean="0"/>
-          </a:p>
-          <a:p>
-            <a:r>
-              <a:rPr lang="zh-CN" altLang="en-US" dirty="0" smtClean="0"/>
-              <a:t> </a:t>
-            </a:r>
-            <a:endParaRPr lang="en-US" dirty="0"/>
-          </a:p>
-        </p:txBody>
-      </p:sp>
-    </p:spTree>
-    <p:extLst>
-      <p:ext uri="{BB962C8B-B14F-4D97-AF65-F5344CB8AC3E}">
-        <p14:creationId xmlns:p14="http://schemas.microsoft.com/office/powerpoint/2010/main" val="353346647"/>
-      </p:ext>
-    </p:extLst>
-  </p:cSld>
-  <p:clrMapOvr>
-    <a:masterClrMapping/>
-  </p:clrMapOvr>
+  <p:timing>
+    <p:tnLst>
+      <p:par>
+        <p:cTn xmlns:p14="http://schemas.microsoft.com/office/powerpoint/2010/main" id="1" dur="indefinite" restart="never" nodeType="tmRoot"/>
+      </p:par>
+    </p:tnLst>
+  </p:timing>
 </p:sld>
 </file>
 
@@ -6454,6 +6524,13 @@
   <p:clrMapOvr>
     <a:masterClrMapping/>
   </p:clrMapOvr>
+  <p:timing>
+    <p:tnLst>
+      <p:par>
+        <p:cTn xmlns:p14="http://schemas.microsoft.com/office/powerpoint/2010/main" id="1" dur="indefinite" restart="never" nodeType="tmRoot"/>
+      </p:par>
+    </p:tnLst>
+  </p:timing>
 </p:sld>
 </file>
 
@@ -6643,6 +6720,13 @@
   <p:clrMapOvr>
     <a:masterClrMapping/>
   </p:clrMapOvr>
+  <p:timing>
+    <p:tnLst>
+      <p:par>
+        <p:cTn xmlns:p14="http://schemas.microsoft.com/office/powerpoint/2010/main" id="1" dur="indefinite" restart="never" nodeType="tmRoot"/>
+      </p:par>
+    </p:tnLst>
+  </p:timing>
 </p:sld>
 </file>
 
@@ -6831,6 +6915,13 @@
   <p:clrMapOvr>
     <a:masterClrMapping/>
   </p:clrMapOvr>
+  <p:timing>
+    <p:tnLst>
+      <p:par>
+        <p:cTn xmlns:p14="http://schemas.microsoft.com/office/powerpoint/2010/main" id="1" dur="indefinite" restart="never" nodeType="tmRoot"/>
+      </p:par>
+    </p:tnLst>
+  </p:timing>
 </p:sld>
 </file>
 
@@ -7039,6 +7130,13 @@
   <p:clrMapOvr>
     <a:masterClrMapping/>
   </p:clrMapOvr>
+  <p:timing>
+    <p:tnLst>
+      <p:par>
+        <p:cTn xmlns:p14="http://schemas.microsoft.com/office/powerpoint/2010/main" id="1" dur="indefinite" restart="never" nodeType="tmRoot"/>
+      </p:par>
+    </p:tnLst>
+  </p:timing>
 </p:sld>
 </file>
 
@@ -7899,6 +7997,13 @@
   <p:clrMapOvr>
     <a:masterClrMapping/>
   </p:clrMapOvr>
+  <p:timing>
+    <p:tnLst>
+      <p:par>
+        <p:cTn xmlns:p14="http://schemas.microsoft.com/office/powerpoint/2010/main" id="1" dur="indefinite" restart="never" nodeType="tmRoot"/>
+      </p:par>
+    </p:tnLst>
+  </p:timing>
 </p:sld>
 </file>
 
@@ -8308,6 +8413,13 @@
   <p:clrMapOvr>
     <a:masterClrMapping/>
   </p:clrMapOvr>
+  <p:timing>
+    <p:tnLst>
+      <p:par>
+        <p:cTn xmlns:p14="http://schemas.microsoft.com/office/powerpoint/2010/main" id="1" dur="indefinite" restart="never" nodeType="tmRoot"/>
+      </p:par>
+    </p:tnLst>
+  </p:timing>
 </p:sld>
 </file>
 

</xml_diff>